<commit_message>
Update Introduction to Python.pptx
</commit_message>
<xml_diff>
--- a/Introduction to Python.pptx
+++ b/Introduction to Python.pptx
@@ -5,10 +5,10 @@
     <p:sldMasterId id="2147483648" r:id="rId1"/>
   </p:sldMasterIdLst>
   <p:notesMasterIdLst>
-    <p:notesMasterId r:id="rId11"/>
+    <p:notesMasterId r:id="rId12"/>
   </p:notesMasterIdLst>
   <p:handoutMasterIdLst>
-    <p:handoutMasterId r:id="rId12"/>
+    <p:handoutMasterId r:id="rId13"/>
   </p:handoutMasterIdLst>
   <p:sldIdLst>
     <p:sldId id="256" r:id="rId2"/>
@@ -18,8 +18,9 @@
     <p:sldId id="259" r:id="rId6"/>
     <p:sldId id="261" r:id="rId7"/>
     <p:sldId id="262" r:id="rId8"/>
-    <p:sldId id="263" r:id="rId9"/>
-    <p:sldId id="264" r:id="rId10"/>
+    <p:sldId id="265" r:id="rId9"/>
+    <p:sldId id="263" r:id="rId10"/>
+    <p:sldId id="264" r:id="rId11"/>
   </p:sldIdLst>
   <p:sldSz cx="12192000" cy="6858000"/>
   <p:notesSz cx="6858000" cy="9144000"/>
@@ -130,6 +131,7 @@
             <p14:sldId id="259"/>
             <p14:sldId id="261"/>
             <p14:sldId id="262"/>
+            <p14:sldId id="265"/>
             <p14:sldId id="263"/>
             <p14:sldId id="264"/>
           </p14:sldIdLst>
@@ -4995,6 +4997,211 @@
 </p:sld>
 </file>
 
+<file path=ppt/slides/slide10.xml><?xml version="1.0" encoding="utf-8"?>
+<p:sld xmlns:a="http://schemas.openxmlformats.org/drawingml/2006/main" xmlns:r="http://schemas.openxmlformats.org/officeDocument/2006/relationships" xmlns:p="http://schemas.openxmlformats.org/presentationml/2006/main">
+  <p:cSld>
+    <p:spTree>
+      <p:nvGrpSpPr>
+        <p:cNvPr id="1" name=""/>
+        <p:cNvGrpSpPr/>
+        <p:nvPr/>
+      </p:nvGrpSpPr>
+      <p:grpSpPr>
+        <a:xfrm>
+          <a:off x="0" y="0"/>
+          <a:ext cx="0" cy="0"/>
+          <a:chOff x="0" y="0"/>
+          <a:chExt cx="0" cy="0"/>
+        </a:xfrm>
+      </p:grpSpPr>
+      <p:sp>
+        <p:nvSpPr>
+          <p:cNvPr id="2" name="Titre 1">
+            <a:extLst>
+              <a:ext uri="{FF2B5EF4-FFF2-40B4-BE49-F238E27FC236}">
+                <a16:creationId xmlns:a16="http://schemas.microsoft.com/office/drawing/2014/main" id="{E98F1E3C-427C-4223-8396-9A72F39ADE89}"/>
+              </a:ext>
+            </a:extLst>
+          </p:cNvPr>
+          <p:cNvSpPr>
+            <a:spLocks noGrp="1"/>
+          </p:cNvSpPr>
+          <p:nvPr>
+            <p:ph type="title"/>
+          </p:nvPr>
+        </p:nvSpPr>
+        <p:spPr/>
+        <p:txBody>
+          <a:bodyPr/>
+          <a:lstStyle/>
+          <a:p>
+            <a:r>
+              <a:rPr lang="fr-FR"/>
+              <a:t>Class 3/4</a:t>
+            </a:r>
+          </a:p>
+        </p:txBody>
+      </p:sp>
+      <p:sp>
+        <p:nvSpPr>
+          <p:cNvPr id="3" name="Espace réservé du pied de page 2">
+            <a:extLst>
+              <a:ext uri="{FF2B5EF4-FFF2-40B4-BE49-F238E27FC236}">
+                <a16:creationId xmlns:a16="http://schemas.microsoft.com/office/drawing/2014/main" id="{FEEE38D0-F1FF-40EB-9A95-1A802E39A599}"/>
+              </a:ext>
+            </a:extLst>
+          </p:cNvPr>
+          <p:cNvSpPr>
+            <a:spLocks noGrp="1"/>
+          </p:cNvSpPr>
+          <p:nvPr>
+            <p:ph type="ftr" sz="quarter" idx="10"/>
+          </p:nvPr>
+        </p:nvSpPr>
+        <p:spPr/>
+        <p:txBody>
+          <a:bodyPr/>
+          <a:lstStyle/>
+          <a:p>
+            <a:r>
+              <a:rPr lang="fr-FR"/>
+              <a:t>DENSYS - MASTER ERASMUS MUNDUS</a:t>
+            </a:r>
+            <a:endParaRPr lang="fr-FR" dirty="0"/>
+          </a:p>
+        </p:txBody>
+      </p:sp>
+      <p:sp>
+        <p:nvSpPr>
+          <p:cNvPr id="4" name="Espace réservé du numéro de diapositive 3">
+            <a:extLst>
+              <a:ext uri="{FF2B5EF4-FFF2-40B4-BE49-F238E27FC236}">
+                <a16:creationId xmlns:a16="http://schemas.microsoft.com/office/drawing/2014/main" id="{83A13E87-CF2C-4C23-8E87-E157EDBBD43A}"/>
+              </a:ext>
+            </a:extLst>
+          </p:cNvPr>
+          <p:cNvSpPr>
+            <a:spLocks noGrp="1"/>
+          </p:cNvSpPr>
+          <p:nvPr>
+            <p:ph type="sldNum" sz="quarter" idx="11"/>
+          </p:nvPr>
+        </p:nvSpPr>
+        <p:spPr/>
+        <p:txBody>
+          <a:bodyPr/>
+          <a:lstStyle/>
+          <a:p>
+            <a:fld id="{CD6AB18C-6132-6B4F-BFF2-4CABB981CC52}" type="slidenum">
+              <a:rPr lang="fr-FR" smtClean="0"/>
+              <a:pPr/>
+              <a:t>10</a:t>
+            </a:fld>
+            <a:endParaRPr lang="fr-FR" dirty="0"/>
+          </a:p>
+        </p:txBody>
+      </p:sp>
+      <p:sp>
+        <p:nvSpPr>
+          <p:cNvPr id="5" name="Espace réservé de la date 4">
+            <a:extLst>
+              <a:ext uri="{FF2B5EF4-FFF2-40B4-BE49-F238E27FC236}">
+                <a16:creationId xmlns:a16="http://schemas.microsoft.com/office/drawing/2014/main" id="{A7F9FE58-C74B-4DD8-A834-B503C38F5594}"/>
+              </a:ext>
+            </a:extLst>
+          </p:cNvPr>
+          <p:cNvSpPr>
+            <a:spLocks noGrp="1"/>
+          </p:cNvSpPr>
+          <p:nvPr>
+            <p:ph type="dt" sz="half" idx="12"/>
+          </p:nvPr>
+        </p:nvSpPr>
+        <p:spPr/>
+        <p:txBody>
+          <a:bodyPr/>
+          <a:lstStyle/>
+          <a:p>
+            <a:r>
+              <a:rPr lang="fr-FR"/>
+              <a:t>15/02/2024</a:t>
+            </a:r>
+            <a:endParaRPr lang="fr-FR" dirty="0"/>
+          </a:p>
+        </p:txBody>
+      </p:sp>
+      <p:sp>
+        <p:nvSpPr>
+          <p:cNvPr id="6" name="Espace réservé du contenu 5">
+            <a:extLst>
+              <a:ext uri="{FF2B5EF4-FFF2-40B4-BE49-F238E27FC236}">
+                <a16:creationId xmlns:a16="http://schemas.microsoft.com/office/drawing/2014/main" id="{06CA9F57-450F-4492-BF86-B98D6F69074C}"/>
+              </a:ext>
+            </a:extLst>
+          </p:cNvPr>
+          <p:cNvSpPr>
+            <a:spLocks noGrp="1"/>
+          </p:cNvSpPr>
+          <p:nvPr>
+            <p:ph sz="quarter" idx="13"/>
+          </p:nvPr>
+        </p:nvSpPr>
+        <p:spPr/>
+        <p:txBody>
+          <a:bodyPr/>
+          <a:lstStyle/>
+          <a:p>
+            <a:r>
+              <a:rPr lang="fr-FR"/>
+              <a:t>Exercise on Lists p. 176</a:t>
+            </a:r>
+          </a:p>
+          <a:p>
+            <a:r>
+              <a:rPr lang="fr-FR"/>
+              <a:t>Exercise on Modules/librairies p. 51-55</a:t>
+            </a:r>
+          </a:p>
+          <a:p>
+            <a:r>
+              <a:rPr lang="fr-FR"/>
+              <a:t>Intro to Pandas p. 193</a:t>
+            </a:r>
+          </a:p>
+          <a:p>
+            <a:r>
+              <a:rPr lang="fr-FR"/>
+              <a:t>Intro to Numpy p. 218</a:t>
+            </a:r>
+          </a:p>
+          <a:p>
+            <a:r>
+              <a:rPr lang="fr-FR"/>
+              <a:t>Intro to Matplotlib p. 226</a:t>
+            </a:r>
+          </a:p>
+          <a:p>
+            <a:endParaRPr lang="fr-FR"/>
+          </a:p>
+          <a:p>
+            <a:pPr lvl="1"/>
+            <a:endParaRPr lang="fr-FR"/>
+          </a:p>
+        </p:txBody>
+      </p:sp>
+    </p:spTree>
+    <p:extLst>
+      <p:ext uri="{BB962C8B-B14F-4D97-AF65-F5344CB8AC3E}">
+        <p14:creationId xmlns:p14="http://schemas.microsoft.com/office/powerpoint/2010/main" val="4191634379"/>
+      </p:ext>
+    </p:extLst>
+  </p:cSld>
+  <p:clrMapOvr>
+    <a:masterClrMapping/>
+  </p:clrMapOvr>
+</p:sld>
+</file>
+
 <file path=ppt/slides/slide2.xml><?xml version="1.0" encoding="utf-8"?>
 <p:sld xmlns:a="http://schemas.openxmlformats.org/drawingml/2006/main" xmlns:r="http://schemas.openxmlformats.org/officeDocument/2006/relationships" xmlns:p="http://schemas.openxmlformats.org/presentationml/2006/main">
   <p:cSld>
@@ -6469,10 +6676,15 @@
             <p:ph sz="quarter" idx="13"/>
           </p:nvPr>
         </p:nvSpPr>
-        <p:spPr/>
+        <p:spPr>
+          <a:xfrm>
+            <a:off x="244929" y="2050027"/>
+            <a:ext cx="11625941" cy="4321314"/>
+          </a:xfrm>
+        </p:spPr>
         <p:txBody>
           <a:bodyPr>
-            <a:normAutofit fontScale="85000" lnSpcReduction="20000"/>
+            <a:normAutofit/>
           </a:bodyPr>
           <a:lstStyle/>
           <a:p>
@@ -6486,7 +6698,7 @@
             </a:pPr>
             <a:r>
               <a:rPr lang="fr-FR"/>
-              <a:t>What we have seen: Variables, Conditions, Iteration, functions</a:t>
+              <a:t>What we have seen: variables, conditions, iteration, functions</a:t>
             </a:r>
           </a:p>
           <a:p>
@@ -6504,144 +6716,21 @@
             </a:r>
           </a:p>
           <a:p>
-            <a:pPr lvl="1">
+            <a:pPr marL="0" indent="0">
               <a:lnSpc>
                 <a:spcPct val="120000"/>
               </a:lnSpc>
               <a:spcBef>
                 <a:spcPts val="0"/>
               </a:spcBef>
+              <a:buNone/>
             </a:pPr>
             <a:r>
-              <a:rPr lang="fr-FR"/>
-              <a:t>When you develop your own code, it is always possible to do without functions but</a:t>
-            </a:r>
-          </a:p>
-          <a:p>
-            <a:pPr lvl="2">
-              <a:lnSpc>
-                <a:spcPct val="120000"/>
-              </a:lnSpc>
-              <a:spcBef>
-                <a:spcPts val="0"/>
-              </a:spcBef>
-            </a:pPr>
-            <a:r>
-              <a:rPr lang="fr-FR"/>
-              <a:t>If you have to do several time the same thing at different locations in your code, you will have either to replicate it, or to create a function</a:t>
-            </a:r>
-          </a:p>
-          <a:p>
-            <a:pPr lvl="2">
-              <a:lnSpc>
-                <a:spcPct val="120000"/>
-              </a:lnSpc>
-              <a:spcBef>
-                <a:spcPts val="0"/>
-              </a:spcBef>
-            </a:pPr>
-            <a:r>
-              <a:rPr lang="fr-FR"/>
-              <a:t>If you replicate your code, </a:t>
-            </a:r>
-          </a:p>
-          <a:p>
-            <a:pPr lvl="3">
-              <a:lnSpc>
-                <a:spcPct val="120000"/>
-              </a:lnSpc>
-              <a:spcBef>
-                <a:spcPts val="0"/>
-              </a:spcBef>
-            </a:pPr>
-            <a:r>
-              <a:rPr lang="fr-FR"/>
-              <a:t>it becomes </a:t>
-            </a:r>
-            <a:r>
               <a:rPr lang="fr-FR">
-                <a:highlight>
-                  <a:srgbClr val="EF9D05"/>
-                </a:highlight>
-              </a:rPr>
-              <a:t>complicated to debug/maintain</a:t>
-            </a:r>
-            <a:r>
-              <a:rPr lang="fr-FR"/>
-              <a:t>. To change something in the code that is replicated, you will have to change it everywhere in your code.</a:t>
-            </a:r>
-          </a:p>
-          <a:p>
-            <a:pPr lvl="3">
-              <a:lnSpc>
-                <a:spcPct val="120000"/>
-              </a:lnSpc>
-              <a:spcBef>
-                <a:spcPts val="0"/>
-              </a:spcBef>
-            </a:pPr>
-            <a:r>
-              <a:rPr lang="fr-FR"/>
-              <a:t>it becomes </a:t>
-            </a:r>
-            <a:r>
-              <a:rPr lang="fr-FR">
-                <a:highlight>
-                  <a:srgbClr val="EF9D05"/>
-                </a:highlight>
-              </a:rPr>
-              <a:t>hard to read/debug</a:t>
-            </a:r>
-            <a:r>
-              <a:rPr lang="fr-FR"/>
-              <a:t>.</a:t>
-            </a:r>
-          </a:p>
-          <a:p>
-            <a:pPr lvl="1">
-              <a:lnSpc>
-                <a:spcPct val="120000"/>
-              </a:lnSpc>
-              <a:spcBef>
-                <a:spcPts val="0"/>
-              </a:spcBef>
-            </a:pPr>
-            <a:r>
-              <a:rPr lang="fr-FR"/>
-              <a:t>When you use librairies, they impose you the creation of function. It makes the algorithme </a:t>
-            </a:r>
-            <a:r>
-              <a:rPr lang="fr-FR">
-                <a:highlight>
-                  <a:srgbClr val="00FF00"/>
-                </a:highlight>
-              </a:rPr>
-              <a:t>reusable</a:t>
-            </a:r>
-          </a:p>
-          <a:p>
-            <a:pPr lvl="2">
-              <a:lnSpc>
-                <a:spcPct val="120000"/>
-              </a:lnSpc>
-              <a:spcBef>
-                <a:spcPts val="0"/>
-              </a:spcBef>
-            </a:pPr>
-            <a:r>
-              <a:rPr lang="fr-FR"/>
-              <a:t>Example: an algorithme minimizing a function will need a function as a parameter</a:t>
-            </a:r>
-          </a:p>
-          <a:p>
-            <a:pPr lvl="2">
-              <a:lnSpc>
-                <a:spcPct val="120000"/>
-              </a:lnSpc>
-              <a:spcBef>
-                <a:spcPts val="0"/>
-              </a:spcBef>
-            </a:pPr>
+                <a:sym typeface="Wingdings" panose="05000000000000000000" pitchFamily="2" charset="2"/>
+              </a:rPr>
+              <a:t>	 see next slide</a:t>
+            </a:r>
             <a:endParaRPr lang="fr-FR"/>
           </a:p>
           <a:p>
@@ -6695,7 +6784,7 @@
           <p:cNvPr id="2" name="Titre 1">
             <a:extLst>
               <a:ext uri="{FF2B5EF4-FFF2-40B4-BE49-F238E27FC236}">
-                <a16:creationId xmlns:a16="http://schemas.microsoft.com/office/drawing/2014/main" id="{E127E5E0-1DC1-4554-AF81-98E8DA585C59}"/>
+                <a16:creationId xmlns:a16="http://schemas.microsoft.com/office/drawing/2014/main" id="{8ED51100-B0C1-4EF0-9A21-9C4141511893}"/>
               </a:ext>
             </a:extLst>
           </p:cNvPr>
@@ -6713,7 +6802,7 @@
           <a:p>
             <a:r>
               <a:rPr lang="fr-FR"/>
-              <a:t>Before class 3/4</a:t>
+              <a:t>Why functions?</a:t>
             </a:r>
           </a:p>
         </p:txBody>
@@ -6723,7 +6812,7 @@
           <p:cNvPr id="3" name="Espace réservé du pied de page 2">
             <a:extLst>
               <a:ext uri="{FF2B5EF4-FFF2-40B4-BE49-F238E27FC236}">
-                <a16:creationId xmlns:a16="http://schemas.microsoft.com/office/drawing/2014/main" id="{02AC8FE9-4200-49EA-A6FC-6D8E008E893E}"/>
+                <a16:creationId xmlns:a16="http://schemas.microsoft.com/office/drawing/2014/main" id="{082E72D9-80A2-48D6-AEE6-7E47AD371DA2}"/>
               </a:ext>
             </a:extLst>
           </p:cNvPr>
@@ -6752,7 +6841,7 @@
           <p:cNvPr id="4" name="Espace réservé du numéro de diapositive 3">
             <a:extLst>
               <a:ext uri="{FF2B5EF4-FFF2-40B4-BE49-F238E27FC236}">
-                <a16:creationId xmlns:a16="http://schemas.microsoft.com/office/drawing/2014/main" id="{D8F7555B-CF53-4E13-BF83-6C5C01392A68}"/>
+                <a16:creationId xmlns:a16="http://schemas.microsoft.com/office/drawing/2014/main" id="{7B50F229-5B65-4F43-A5E7-4F8556154460}"/>
               </a:ext>
             </a:extLst>
           </p:cNvPr>
@@ -6782,7 +6871,7 @@
           <p:cNvPr id="5" name="Espace réservé de la date 4">
             <a:extLst>
               <a:ext uri="{FF2B5EF4-FFF2-40B4-BE49-F238E27FC236}">
-                <a16:creationId xmlns:a16="http://schemas.microsoft.com/office/drawing/2014/main" id="{1B628939-3814-43DA-91CA-7A74FE30B1A4}"/>
+                <a16:creationId xmlns:a16="http://schemas.microsoft.com/office/drawing/2014/main" id="{E04A2BB1-5F11-4965-AA52-854BC9A65656}"/>
               </a:ext>
             </a:extLst>
           </p:cNvPr>
@@ -6811,7 +6900,7 @@
           <p:cNvPr id="6" name="Espace réservé du contenu 5">
             <a:extLst>
               <a:ext uri="{FF2B5EF4-FFF2-40B4-BE49-F238E27FC236}">
-                <a16:creationId xmlns:a16="http://schemas.microsoft.com/office/drawing/2014/main" id="{BB2978E8-4FC1-4E1E-BFD3-9149C65C485B}"/>
+                <a16:creationId xmlns:a16="http://schemas.microsoft.com/office/drawing/2014/main" id="{F959AEE3-1F48-45F9-8C1D-014B343681DB}"/>
               </a:ext>
             </a:extLst>
           </p:cNvPr>
@@ -6822,85 +6911,2060 @@
             <p:ph sz="quarter" idx="13"/>
           </p:nvPr>
         </p:nvSpPr>
-        <p:spPr/>
-        <p:txBody>
-          <a:bodyPr/>
-          <a:lstStyle/>
-          <a:p>
-            <a:r>
-              <a:rPr lang="fr-FR"/>
-              <a:t>For the beginners</a:t>
-            </a:r>
-          </a:p>
-          <a:p>
-            <a:pPr lvl="1"/>
-            <a:r>
-              <a:rPr lang="fr-FR"/>
-              <a:t>Lists: read pp. 128-138, 138-144</a:t>
-            </a:r>
-          </a:p>
-          <a:p>
-            <a:pPr lvl="1"/>
-            <a:r>
-              <a:rPr lang="fr-FR"/>
-              <a:t>Dictionaries: read only p. 145</a:t>
-            </a:r>
-          </a:p>
-          <a:p>
-            <a:pPr lvl="1"/>
-            <a:r>
-              <a:rPr lang="fr-FR"/>
-              <a:t>Intro to modules pp. 51-58</a:t>
-            </a:r>
-          </a:p>
-          <a:p>
-            <a:pPr lvl="1"/>
-            <a:r>
-              <a:rPr lang="fr-FR"/>
-              <a:t>Intro to Numpy p. 218-220</a:t>
-            </a:r>
-          </a:p>
-          <a:p>
-            <a:pPr lvl="1"/>
-            <a:r>
-              <a:rPr lang="fr-FR"/>
-              <a:t>Intro to Matplotlib p. 226-240 (to skim read)</a:t>
-            </a:r>
-          </a:p>
-          <a:p>
-            <a:pPr lvl="1"/>
-            <a:r>
-              <a:rPr lang="fr-FR"/>
-              <a:t>Intro to Pandas p. 193-202 (to skim read if you have the time)</a:t>
-            </a:r>
-          </a:p>
-          <a:p>
-            <a:pPr lvl="1"/>
+        <p:spPr>
+          <a:xfrm>
+            <a:off x="244930" y="2050026"/>
+            <a:ext cx="5985542" cy="4619715"/>
+          </a:xfrm>
+        </p:spPr>
+        <p:txBody>
+          <a:bodyPr>
+            <a:normAutofit fontScale="55000" lnSpcReduction="20000"/>
+          </a:bodyPr>
+          <a:lstStyle/>
+          <a:p>
+            <a:pPr>
+              <a:lnSpc>
+                <a:spcPct val="120000"/>
+              </a:lnSpc>
+              <a:spcBef>
+                <a:spcPts val="0"/>
+              </a:spcBef>
+            </a:pPr>
+            <a:r>
+              <a:rPr lang="fr-FR"/>
+              <a:t>When you develop your own code, it is always possible to do without functions but</a:t>
+            </a:r>
+          </a:p>
+          <a:p>
+            <a:pPr lvl="1">
+              <a:lnSpc>
+                <a:spcPct val="120000"/>
+              </a:lnSpc>
+              <a:spcBef>
+                <a:spcPts val="0"/>
+              </a:spcBef>
+            </a:pPr>
+            <a:r>
+              <a:rPr lang="fr-FR"/>
+              <a:t>If you have to do several times the same thing (let's say calculate the distance between 2 points in 3D) at different locations in your code, you will have either to replicate it, or to create a function</a:t>
+            </a:r>
+          </a:p>
+          <a:p>
+            <a:pPr lvl="1">
+              <a:lnSpc>
+                <a:spcPct val="120000"/>
+              </a:lnSpc>
+              <a:spcBef>
+                <a:spcPts val="0"/>
+              </a:spcBef>
+            </a:pPr>
+            <a:r>
+              <a:rPr lang="fr-FR"/>
+              <a:t>If you replicate your code, </a:t>
+            </a:r>
+          </a:p>
+          <a:p>
+            <a:pPr lvl="2">
+              <a:lnSpc>
+                <a:spcPct val="120000"/>
+              </a:lnSpc>
+              <a:spcBef>
+                <a:spcPts val="0"/>
+              </a:spcBef>
+            </a:pPr>
+            <a:r>
+              <a:rPr lang="fr-FR"/>
+              <a:t>it becomes </a:t>
+            </a:r>
+            <a:r>
+              <a:rPr lang="fr-FR">
+                <a:highlight>
+                  <a:srgbClr val="EF9D05"/>
+                </a:highlight>
+              </a:rPr>
+              <a:t>complicated to debug/maintain</a:t>
+            </a:r>
+            <a:r>
+              <a:rPr lang="fr-FR"/>
+              <a:t>. To change something in the code that is replicated, you will have to change it everywhere in your code.</a:t>
+            </a:r>
+          </a:p>
+          <a:p>
+            <a:pPr lvl="2">
+              <a:lnSpc>
+                <a:spcPct val="120000"/>
+              </a:lnSpc>
+              <a:spcBef>
+                <a:spcPts val="0"/>
+              </a:spcBef>
+            </a:pPr>
+            <a:r>
+              <a:rPr lang="fr-FR"/>
+              <a:t>it becomes </a:t>
+            </a:r>
+            <a:r>
+              <a:rPr lang="fr-FR">
+                <a:highlight>
+                  <a:srgbClr val="EF9D05"/>
+                </a:highlight>
+              </a:rPr>
+              <a:t>hard to read/debug</a:t>
+            </a:r>
+            <a:r>
+              <a:rPr lang="fr-FR"/>
+              <a:t>.</a:t>
+            </a:r>
+          </a:p>
+          <a:p>
+            <a:pPr>
+              <a:lnSpc>
+                <a:spcPct val="120000"/>
+              </a:lnSpc>
+              <a:spcBef>
+                <a:spcPts val="0"/>
+              </a:spcBef>
+            </a:pPr>
+            <a:r>
+              <a:rPr lang="fr-FR"/>
+              <a:t>Functions allow you to </a:t>
+            </a:r>
+            <a:r>
+              <a:rPr lang="fr-FR">
+                <a:highlight>
+                  <a:srgbClr val="00FF00"/>
+                </a:highlight>
+              </a:rPr>
+              <a:t>encapsulate</a:t>
+            </a:r>
+            <a:r>
+              <a:rPr lang="fr-FR"/>
+              <a:t> your work and to </a:t>
+            </a:r>
+            <a:r>
+              <a:rPr lang="fr-FR">
+                <a:highlight>
+                  <a:srgbClr val="00FF00"/>
+                </a:highlight>
+              </a:rPr>
+              <a:t>collaborate</a:t>
+            </a:r>
+            <a:r>
+              <a:rPr lang="fr-FR"/>
+              <a:t> efficiently:</a:t>
+            </a:r>
+          </a:p>
+          <a:p>
+            <a:pPr lvl="1">
+              <a:lnSpc>
+                <a:spcPct val="120000"/>
+              </a:lnSpc>
+              <a:spcBef>
+                <a:spcPts val="0"/>
+              </a:spcBef>
+            </a:pPr>
+            <a:r>
+              <a:rPr lang="fr-FR"/>
+              <a:t>Let's say that you create a magic formula to calculate the production of a PC panel as function of temperature and radiation.</a:t>
+            </a:r>
+          </a:p>
+          <a:p>
+            <a:pPr lvl="1">
+              <a:lnSpc>
+                <a:spcPct val="120000"/>
+              </a:lnSpc>
+              <a:spcBef>
+                <a:spcPts val="0"/>
+              </a:spcBef>
+            </a:pPr>
+            <a:r>
+              <a:rPr lang="fr-FR"/>
+              <a:t>If you simply write it in the middle of a bigger code, you have to </a:t>
+            </a:r>
+            <a:r>
+              <a:rPr lang="fr-FR">
+                <a:highlight>
+                  <a:srgbClr val="EF9D05"/>
+                </a:highlight>
+              </a:rPr>
+              <a:t>replicate and modify </a:t>
+            </a:r>
+            <a:r>
+              <a:rPr lang="fr-FR"/>
+              <a:t>it. Look at the example on the top right.</a:t>
+            </a:r>
+          </a:p>
+          <a:p>
+            <a:pPr lvl="1">
+              <a:lnSpc>
+                <a:spcPct val="120000"/>
+              </a:lnSpc>
+              <a:spcBef>
+                <a:spcPts val="0"/>
+              </a:spcBef>
+            </a:pPr>
+            <a:r>
+              <a:rPr lang="fr-FR"/>
+              <a:t>If you create a function, you can it several time and everybody body can </a:t>
+            </a:r>
+            <a:r>
+              <a:rPr lang="fr-FR">
+                <a:highlight>
+                  <a:srgbClr val="00FF00"/>
+                </a:highlight>
+              </a:rPr>
+              <a:t>reuse</a:t>
+            </a:r>
+            <a:r>
+              <a:rPr lang="fr-FR"/>
+              <a:t> this piece of code without changing anything to the code. </a:t>
+            </a:r>
+          </a:p>
+          <a:p>
+            <a:pPr>
+              <a:lnSpc>
+                <a:spcPct val="120000"/>
+              </a:lnSpc>
+              <a:spcBef>
+                <a:spcPts val="0"/>
+              </a:spcBef>
+            </a:pPr>
+            <a:r>
+              <a:rPr lang="fr-FR"/>
+              <a:t>When you use librairies, they impose you the creation of functions. It makes the algorithme </a:t>
+            </a:r>
+            <a:r>
+              <a:rPr lang="fr-FR">
+                <a:highlight>
+                  <a:srgbClr val="00FF00"/>
+                </a:highlight>
+              </a:rPr>
+              <a:t>reusable</a:t>
+            </a:r>
+          </a:p>
+          <a:p>
+            <a:pPr lvl="1">
+              <a:lnSpc>
+                <a:spcPct val="120000"/>
+              </a:lnSpc>
+              <a:spcBef>
+                <a:spcPts val="0"/>
+              </a:spcBef>
+            </a:pPr>
+            <a:r>
+              <a:rPr lang="fr-FR"/>
+              <a:t>Example: an algorithme minimizing a function will need a function as a parameter</a:t>
+            </a:r>
+          </a:p>
+          <a:p>
             <a:endParaRPr lang="fr-FR"/>
           </a:p>
-          <a:p>
-            <a:r>
-              <a:rPr lang="fr-FR"/>
-              <a:t>For the more advanced students</a:t>
-            </a:r>
-          </a:p>
-          <a:p>
-            <a:pPr lvl="1"/>
-            <a:r>
-              <a:rPr lang="fr-FR"/>
-              <a:t>All together, clean up a version of your code to share it with the beginners</a:t>
-            </a:r>
-          </a:p>
-          <a:p>
-            <a:pPr lvl="1"/>
-            <a:endParaRPr lang="fr-FR"/>
+        </p:txBody>
+      </p:sp>
+      <p:sp>
+        <p:nvSpPr>
+          <p:cNvPr id="7" name="Espace réservé du contenu 5">
+            <a:extLst>
+              <a:ext uri="{FF2B5EF4-FFF2-40B4-BE49-F238E27FC236}">
+                <a16:creationId xmlns:a16="http://schemas.microsoft.com/office/drawing/2014/main" id="{1C865AC2-1449-4731-833C-21E9F311D554}"/>
+              </a:ext>
+            </a:extLst>
+          </p:cNvPr>
+          <p:cNvSpPr txBox="1">
+            <a:spLocks/>
+          </p:cNvSpPr>
+          <p:nvPr/>
+        </p:nvSpPr>
+        <p:spPr>
+          <a:xfrm>
+            <a:off x="6850538" y="1709367"/>
+            <a:ext cx="4815646" cy="4203137"/>
+          </a:xfrm>
+          <a:prstGeom prst="rect">
+            <a:avLst/>
+          </a:prstGeom>
+        </p:spPr>
+        <p:txBody>
+          <a:bodyPr vert="horz" lIns="91440" tIns="45720" rIns="91440" bIns="45720" rtlCol="0">
+            <a:normAutofit fontScale="85000" lnSpcReduction="10000"/>
+          </a:bodyPr>
+          <a:lstStyle>
+            <a:lvl1pPr marL="228600" indent="-228600" algn="l" defTabSz="914400" rtl="0" eaLnBrk="1" latinLnBrk="0" hangingPunct="1">
+              <a:lnSpc>
+                <a:spcPct val="90000"/>
+              </a:lnSpc>
+              <a:spcBef>
+                <a:spcPts val="1000"/>
+              </a:spcBef>
+              <a:buClr>
+                <a:schemeClr val="accent1"/>
+              </a:buClr>
+              <a:buSzPct val="110000"/>
+              <a:buFont typeface="Arial" panose="020B0604020202020204" pitchFamily="34" charset="0"/>
+              <a:buChar char="•"/>
+              <a:defRPr sz="2400" b="0" i="0" kern="1200">
+                <a:solidFill>
+                  <a:schemeClr val="tx1"/>
+                </a:solidFill>
+                <a:latin typeface="Arial" panose="020B0604020202020204" pitchFamily="34" charset="0"/>
+                <a:ea typeface="+mn-ea"/>
+                <a:cs typeface="Arial" panose="020B0604020202020204" pitchFamily="34" charset="0"/>
+              </a:defRPr>
+            </a:lvl1pPr>
+            <a:lvl2pPr marL="685800" indent="-228600" algn="l" defTabSz="914400" rtl="0" eaLnBrk="1" latinLnBrk="0" hangingPunct="1">
+              <a:lnSpc>
+                <a:spcPct val="90000"/>
+              </a:lnSpc>
+              <a:spcBef>
+                <a:spcPts val="500"/>
+              </a:spcBef>
+              <a:buClr>
+                <a:schemeClr val="accent2"/>
+              </a:buClr>
+              <a:buFont typeface="Arial" panose="020B0604020202020204" pitchFamily="34" charset="0"/>
+              <a:buChar char="•"/>
+              <a:defRPr sz="2400" kern="1200">
+                <a:solidFill>
+                  <a:schemeClr val="tx1"/>
+                </a:solidFill>
+                <a:latin typeface="+mn-lt"/>
+                <a:ea typeface="+mn-ea"/>
+                <a:cs typeface="+mn-cs"/>
+              </a:defRPr>
+            </a:lvl2pPr>
+            <a:lvl3pPr marL="1143000" indent="-228600" algn="l" defTabSz="914400" rtl="0" eaLnBrk="1" latinLnBrk="0" hangingPunct="1">
+              <a:lnSpc>
+                <a:spcPct val="90000"/>
+              </a:lnSpc>
+              <a:spcBef>
+                <a:spcPts val="500"/>
+              </a:spcBef>
+              <a:buClr>
+                <a:schemeClr val="accent6"/>
+              </a:buClr>
+              <a:buFont typeface="Arial" panose="020B0604020202020204" pitchFamily="34" charset="0"/>
+              <a:buChar char="•"/>
+              <a:defRPr sz="2000" kern="1200">
+                <a:solidFill>
+                  <a:schemeClr val="tx1"/>
+                </a:solidFill>
+                <a:latin typeface="+mn-lt"/>
+                <a:ea typeface="+mn-ea"/>
+                <a:cs typeface="+mn-cs"/>
+              </a:defRPr>
+            </a:lvl3pPr>
+            <a:lvl4pPr marL="1600200" indent="-228600" algn="l" defTabSz="914400" rtl="0" eaLnBrk="1" latinLnBrk="0" hangingPunct="1">
+              <a:lnSpc>
+                <a:spcPct val="90000"/>
+              </a:lnSpc>
+              <a:spcBef>
+                <a:spcPts val="500"/>
+              </a:spcBef>
+              <a:buClr>
+                <a:schemeClr val="accent6"/>
+              </a:buClr>
+              <a:buFont typeface="Police système"/>
+              <a:buChar char="-"/>
+              <a:defRPr sz="1800" kern="1200">
+                <a:solidFill>
+                  <a:schemeClr val="tx1"/>
+                </a:solidFill>
+                <a:latin typeface="+mn-lt"/>
+                <a:ea typeface="+mn-ea"/>
+                <a:cs typeface="+mn-cs"/>
+              </a:defRPr>
+            </a:lvl4pPr>
+            <a:lvl5pPr marL="2057400" indent="-228600" algn="l" defTabSz="914400" rtl="0" eaLnBrk="1" latinLnBrk="0" hangingPunct="1">
+              <a:lnSpc>
+                <a:spcPct val="90000"/>
+              </a:lnSpc>
+              <a:spcBef>
+                <a:spcPts val="500"/>
+              </a:spcBef>
+              <a:buFont typeface="Arial" panose="020B0604020202020204" pitchFamily="34" charset="0"/>
+              <a:buChar char="•"/>
+              <a:defRPr sz="1800" kern="1200">
+                <a:solidFill>
+                  <a:schemeClr val="tx1"/>
+                </a:solidFill>
+                <a:latin typeface="+mn-lt"/>
+                <a:ea typeface="+mn-ea"/>
+                <a:cs typeface="+mn-cs"/>
+              </a:defRPr>
+            </a:lvl5pPr>
+            <a:lvl6pPr marL="2514600" indent="-228600" algn="l" defTabSz="914400" rtl="0" eaLnBrk="1" latinLnBrk="0" hangingPunct="1">
+              <a:lnSpc>
+                <a:spcPct val="90000"/>
+              </a:lnSpc>
+              <a:spcBef>
+                <a:spcPts val="500"/>
+              </a:spcBef>
+              <a:buFont typeface="Arial" panose="020B0604020202020204" pitchFamily="34" charset="0"/>
+              <a:buChar char="•"/>
+              <a:defRPr sz="1800" kern="1200">
+                <a:solidFill>
+                  <a:schemeClr val="tx1"/>
+                </a:solidFill>
+                <a:latin typeface="+mn-lt"/>
+                <a:ea typeface="+mn-ea"/>
+                <a:cs typeface="+mn-cs"/>
+              </a:defRPr>
+            </a:lvl6pPr>
+            <a:lvl7pPr marL="2971800" indent="-228600" algn="l" defTabSz="914400" rtl="0" eaLnBrk="1" latinLnBrk="0" hangingPunct="1">
+              <a:lnSpc>
+                <a:spcPct val="90000"/>
+              </a:lnSpc>
+              <a:spcBef>
+                <a:spcPts val="500"/>
+              </a:spcBef>
+              <a:buFont typeface="Arial" panose="020B0604020202020204" pitchFamily="34" charset="0"/>
+              <a:buChar char="•"/>
+              <a:defRPr sz="1800" kern="1200">
+                <a:solidFill>
+                  <a:schemeClr val="tx1"/>
+                </a:solidFill>
+                <a:latin typeface="+mn-lt"/>
+                <a:ea typeface="+mn-ea"/>
+                <a:cs typeface="+mn-cs"/>
+              </a:defRPr>
+            </a:lvl7pPr>
+            <a:lvl8pPr marL="3429000" indent="-228600" algn="l" defTabSz="914400" rtl="0" eaLnBrk="1" latinLnBrk="0" hangingPunct="1">
+              <a:lnSpc>
+                <a:spcPct val="90000"/>
+              </a:lnSpc>
+              <a:spcBef>
+                <a:spcPts val="500"/>
+              </a:spcBef>
+              <a:buFont typeface="Arial" panose="020B0604020202020204" pitchFamily="34" charset="0"/>
+              <a:buChar char="•"/>
+              <a:defRPr sz="1800" kern="1200">
+                <a:solidFill>
+                  <a:schemeClr val="tx1"/>
+                </a:solidFill>
+                <a:latin typeface="+mn-lt"/>
+                <a:ea typeface="+mn-ea"/>
+                <a:cs typeface="+mn-cs"/>
+              </a:defRPr>
+            </a:lvl8pPr>
+            <a:lvl9pPr marL="3886200" indent="-228600" algn="l" defTabSz="914400" rtl="0" eaLnBrk="1" latinLnBrk="0" hangingPunct="1">
+              <a:lnSpc>
+                <a:spcPct val="90000"/>
+              </a:lnSpc>
+              <a:spcBef>
+                <a:spcPts val="500"/>
+              </a:spcBef>
+              <a:buFont typeface="Arial" panose="020B0604020202020204" pitchFamily="34" charset="0"/>
+              <a:buChar char="•"/>
+              <a:defRPr sz="1800" kern="1200">
+                <a:solidFill>
+                  <a:schemeClr val="tx1"/>
+                </a:solidFill>
+                <a:latin typeface="+mn-lt"/>
+                <a:ea typeface="+mn-ea"/>
+                <a:cs typeface="+mn-cs"/>
+              </a:defRPr>
+            </a:lvl9pPr>
+          </a:lstStyle>
+          <a:p>
+            <a:pPr marL="0" indent="0">
+              <a:lnSpc>
+                <a:spcPct val="120000"/>
+              </a:lnSpc>
+              <a:spcBef>
+                <a:spcPts val="0"/>
+              </a:spcBef>
+              <a:buNone/>
+            </a:pPr>
+            <a:r>
+              <a:rPr lang="fr-FR" sz="1800">
+                <a:solidFill>
+                  <a:srgbClr val="008000"/>
+                </a:solidFill>
+                <a:highlight>
+                  <a:srgbClr val="FFFFFF"/>
+                </a:highlight>
+              </a:rPr>
+              <a:t># with no function</a:t>
+            </a:r>
+            <a:endParaRPr lang="fr-FR" sz="1800">
+              <a:solidFill>
+                <a:srgbClr val="000000"/>
+              </a:solidFill>
+              <a:highlight>
+                <a:srgbClr val="FFFFFF"/>
+              </a:highlight>
+            </a:endParaRPr>
+          </a:p>
+          <a:p>
+            <a:pPr marL="0" indent="0">
+              <a:lnSpc>
+                <a:spcPct val="120000"/>
+              </a:lnSpc>
+              <a:spcBef>
+                <a:spcPts val="0"/>
+              </a:spcBef>
+              <a:buNone/>
+            </a:pPr>
+            <a:r>
+              <a:rPr lang="fr-FR" sz="1800">
+                <a:solidFill>
+                  <a:srgbClr val="000000"/>
+                </a:solidFill>
+                <a:highlight>
+                  <a:srgbClr val="FFFFFF"/>
+                </a:highlight>
+              </a:rPr>
+              <a:t>Tref </a:t>
+            </a:r>
+            <a:r>
+              <a:rPr lang="fr-FR" sz="1800" b="1">
+                <a:solidFill>
+                  <a:srgbClr val="000080"/>
+                </a:solidFill>
+                <a:highlight>
+                  <a:srgbClr val="FFFFFF"/>
+                </a:highlight>
+              </a:rPr>
+              <a:t>=</a:t>
+            </a:r>
+            <a:r>
+              <a:rPr lang="fr-FR" sz="1800" b="0">
+                <a:solidFill>
+                  <a:srgbClr val="000000"/>
+                </a:solidFill>
+                <a:highlight>
+                  <a:srgbClr val="FFFFFF"/>
+                </a:highlight>
+              </a:rPr>
+              <a:t> </a:t>
+            </a:r>
+            <a:r>
+              <a:rPr lang="fr-FR" sz="1800" b="0">
+                <a:solidFill>
+                  <a:srgbClr val="FF0000"/>
+                </a:solidFill>
+                <a:highlight>
+                  <a:srgbClr val="FFFFFF"/>
+                </a:highlight>
+              </a:rPr>
+              <a:t>273.15</a:t>
+            </a:r>
+            <a:endParaRPr lang="fr-FR" sz="1800" b="0">
+              <a:solidFill>
+                <a:srgbClr val="000000"/>
+              </a:solidFill>
+              <a:highlight>
+                <a:srgbClr val="FFFFFF"/>
+              </a:highlight>
+            </a:endParaRPr>
+          </a:p>
+          <a:p>
+            <a:pPr marL="0" indent="0">
+              <a:lnSpc>
+                <a:spcPct val="120000"/>
+              </a:lnSpc>
+              <a:spcBef>
+                <a:spcPts val="0"/>
+              </a:spcBef>
+              <a:buNone/>
+            </a:pPr>
+            <a:r>
+              <a:rPr lang="nn-NO" sz="1800" b="0">
+                <a:solidFill>
+                  <a:srgbClr val="000000"/>
+                </a:solidFill>
+                <a:highlight>
+                  <a:srgbClr val="FFFFFF"/>
+                </a:highlight>
+              </a:rPr>
+              <a:t>prod_pv_1 </a:t>
+            </a:r>
+            <a:r>
+              <a:rPr lang="nn-NO" sz="1800" b="1">
+                <a:solidFill>
+                  <a:srgbClr val="000080"/>
+                </a:solidFill>
+                <a:highlight>
+                  <a:srgbClr val="FFFFFF"/>
+                </a:highlight>
+              </a:rPr>
+              <a:t>=</a:t>
+            </a:r>
+            <a:r>
+              <a:rPr lang="nn-NO" sz="1800" b="0">
+                <a:solidFill>
+                  <a:srgbClr val="000000"/>
+                </a:solidFill>
+                <a:highlight>
+                  <a:srgbClr val="FFFFFF"/>
+                </a:highlight>
+              </a:rPr>
+              <a:t> a</a:t>
+            </a:r>
+            <a:r>
+              <a:rPr lang="nn-NO" sz="1800" b="1">
+                <a:solidFill>
+                  <a:srgbClr val="000080"/>
+                </a:solidFill>
+                <a:highlight>
+                  <a:srgbClr val="FFFFFF"/>
+                </a:highlight>
+              </a:rPr>
+              <a:t>*</a:t>
+            </a:r>
+            <a:r>
+              <a:rPr lang="nn-NO" sz="1800" b="0">
+                <a:solidFill>
+                  <a:srgbClr val="000000"/>
+                </a:solidFill>
+                <a:highlight>
+                  <a:srgbClr val="FFFFFF"/>
+                </a:highlight>
+              </a:rPr>
+              <a:t>rad1 </a:t>
+            </a:r>
+            <a:r>
+              <a:rPr lang="nn-NO" sz="1800" b="1">
+                <a:solidFill>
+                  <a:srgbClr val="000080"/>
+                </a:solidFill>
+                <a:highlight>
+                  <a:srgbClr val="FFFFFF"/>
+                </a:highlight>
+              </a:rPr>
+              <a:t>+</a:t>
+            </a:r>
+            <a:r>
+              <a:rPr lang="nn-NO" sz="1800" b="0">
+                <a:solidFill>
+                  <a:srgbClr val="000000"/>
+                </a:solidFill>
+                <a:highlight>
+                  <a:srgbClr val="FFFFFF"/>
+                </a:highlight>
+              </a:rPr>
+              <a:t> b</a:t>
+            </a:r>
+            <a:r>
+              <a:rPr lang="nn-NO" sz="1800" b="1">
+                <a:solidFill>
+                  <a:srgbClr val="000080"/>
+                </a:solidFill>
+                <a:highlight>
+                  <a:srgbClr val="FFFFFF"/>
+                </a:highlight>
+              </a:rPr>
+              <a:t>*</a:t>
+            </a:r>
+            <a:r>
+              <a:rPr lang="nn-NO" sz="1800" b="0">
+                <a:solidFill>
+                  <a:srgbClr val="000000"/>
+                </a:solidFill>
+                <a:highlight>
+                  <a:srgbClr val="FFFFFF"/>
+                </a:highlight>
+              </a:rPr>
+              <a:t>rad1</a:t>
+            </a:r>
+            <a:r>
+              <a:rPr lang="nn-NO" sz="1800" b="1">
+                <a:solidFill>
+                  <a:srgbClr val="000080"/>
+                </a:solidFill>
+                <a:highlight>
+                  <a:srgbClr val="FFFFFF"/>
+                </a:highlight>
+              </a:rPr>
+              <a:t>^</a:t>
+            </a:r>
+            <a:r>
+              <a:rPr lang="nn-NO" sz="1800" b="0">
+                <a:solidFill>
+                  <a:srgbClr val="FF0000"/>
+                </a:solidFill>
+                <a:highlight>
+                  <a:srgbClr val="FFFFFF"/>
+                </a:highlight>
+              </a:rPr>
+              <a:t>2</a:t>
+            </a:r>
+            <a:r>
+              <a:rPr lang="nn-NO" sz="1800" b="0">
+                <a:solidFill>
+                  <a:srgbClr val="000000"/>
+                </a:solidFill>
+                <a:highlight>
+                  <a:srgbClr val="FFFFFF"/>
+                </a:highlight>
+              </a:rPr>
+              <a:t> </a:t>
+            </a:r>
+            <a:r>
+              <a:rPr lang="nn-NO" sz="1800" b="1">
+                <a:solidFill>
+                  <a:srgbClr val="000080"/>
+                </a:solidFill>
+                <a:highlight>
+                  <a:srgbClr val="FFFFFF"/>
+                </a:highlight>
+              </a:rPr>
+              <a:t>+</a:t>
+            </a:r>
+            <a:r>
+              <a:rPr lang="nn-NO" sz="1800" b="0">
+                <a:solidFill>
+                  <a:srgbClr val="000000"/>
+                </a:solidFill>
+                <a:highlight>
+                  <a:srgbClr val="FFFFFF"/>
+                </a:highlight>
+              </a:rPr>
+              <a:t> …</a:t>
+            </a:r>
+          </a:p>
+          <a:p>
+            <a:pPr marL="0" indent="0">
+              <a:lnSpc>
+                <a:spcPct val="120000"/>
+              </a:lnSpc>
+              <a:spcBef>
+                <a:spcPts val="0"/>
+              </a:spcBef>
+              <a:buNone/>
+            </a:pPr>
+            <a:r>
+              <a:rPr lang="fr-FR" sz="1800" b="0">
+                <a:solidFill>
+                  <a:srgbClr val="000000"/>
+                </a:solidFill>
+                <a:highlight>
+                  <a:srgbClr val="FFFFFF"/>
+                </a:highlight>
+              </a:rPr>
+              <a:t>prod_pv_1 </a:t>
+            </a:r>
+            <a:r>
+              <a:rPr lang="fr-FR" sz="1800" b="1">
+                <a:solidFill>
+                  <a:srgbClr val="000080"/>
+                </a:solidFill>
+                <a:highlight>
+                  <a:srgbClr val="FFFFFF"/>
+                </a:highlight>
+              </a:rPr>
+              <a:t>=</a:t>
+            </a:r>
+            <a:r>
+              <a:rPr lang="fr-FR" sz="1800" b="0">
+                <a:solidFill>
+                  <a:srgbClr val="000000"/>
+                </a:solidFill>
+                <a:highlight>
+                  <a:srgbClr val="FFFFFF"/>
+                </a:highlight>
+              </a:rPr>
+              <a:t> prod_pv_1 </a:t>
+            </a:r>
+            <a:r>
+              <a:rPr lang="fr-FR" sz="1800" b="1">
+                <a:solidFill>
+                  <a:srgbClr val="000080"/>
+                </a:solidFill>
+                <a:highlight>
+                  <a:srgbClr val="FFFFFF"/>
+                </a:highlight>
+              </a:rPr>
+              <a:t>*</a:t>
+            </a:r>
+            <a:r>
+              <a:rPr lang="fr-FR" sz="1800" b="0">
+                <a:solidFill>
+                  <a:srgbClr val="000000"/>
+                </a:solidFill>
+                <a:highlight>
+                  <a:srgbClr val="FFFFFF"/>
+                </a:highlight>
+              </a:rPr>
+              <a:t> atan</a:t>
+            </a:r>
+            <a:r>
+              <a:rPr lang="fr-FR" sz="1800" b="1">
+                <a:solidFill>
+                  <a:srgbClr val="000080"/>
+                </a:solidFill>
+                <a:highlight>
+                  <a:srgbClr val="FFFFFF"/>
+                </a:highlight>
+              </a:rPr>
+              <a:t>((</a:t>
+            </a:r>
+            <a:r>
+              <a:rPr lang="fr-FR" sz="1800" b="0">
+                <a:solidFill>
+                  <a:srgbClr val="000000"/>
+                </a:solidFill>
+                <a:highlight>
+                  <a:srgbClr val="FFFFFF"/>
+                </a:highlight>
+              </a:rPr>
+              <a:t>temp1</a:t>
+            </a:r>
+            <a:r>
+              <a:rPr lang="fr-FR" sz="1800" b="1">
+                <a:solidFill>
+                  <a:srgbClr val="000080"/>
+                </a:solidFill>
+                <a:highlight>
+                  <a:srgbClr val="FFFFFF"/>
+                </a:highlight>
+              </a:rPr>
+              <a:t>-</a:t>
+            </a:r>
+            <a:r>
+              <a:rPr lang="fr-FR" sz="1800" b="0">
+                <a:solidFill>
+                  <a:srgbClr val="000000"/>
+                </a:solidFill>
+                <a:highlight>
+                  <a:srgbClr val="FFFFFF"/>
+                </a:highlight>
+              </a:rPr>
+              <a:t>Tref</a:t>
+            </a:r>
+            <a:r>
+              <a:rPr lang="fr-FR" sz="1800" b="1">
+                <a:solidFill>
+                  <a:srgbClr val="000080"/>
+                </a:solidFill>
+                <a:highlight>
+                  <a:srgbClr val="FFFFFF"/>
+                </a:highlight>
+              </a:rPr>
+              <a:t>)/</a:t>
+            </a:r>
+            <a:r>
+              <a:rPr lang="fr-FR" sz="1800" b="0">
+                <a:solidFill>
+                  <a:srgbClr val="000000"/>
+                </a:solidFill>
+                <a:highlight>
+                  <a:srgbClr val="FFFFFF"/>
+                </a:highlight>
+              </a:rPr>
+              <a:t>Tref</a:t>
+            </a:r>
+            <a:r>
+              <a:rPr lang="fr-FR" sz="1800" b="1">
+                <a:solidFill>
+                  <a:srgbClr val="000080"/>
+                </a:solidFill>
+                <a:highlight>
+                  <a:srgbClr val="FFFFFF"/>
+                </a:highlight>
+              </a:rPr>
+              <a:t>)</a:t>
+            </a:r>
+            <a:r>
+              <a:rPr lang="fr-FR" sz="1800" b="0">
+                <a:solidFill>
+                  <a:srgbClr val="000000"/>
+                </a:solidFill>
+                <a:highlight>
+                  <a:srgbClr val="FFFFFF"/>
+                </a:highlight>
+              </a:rPr>
+              <a:t> </a:t>
+            </a:r>
+            <a:r>
+              <a:rPr lang="fr-FR" sz="1800" b="1">
+                <a:solidFill>
+                  <a:srgbClr val="000080"/>
+                </a:solidFill>
+                <a:highlight>
+                  <a:srgbClr val="FFFFFF"/>
+                </a:highlight>
+              </a:rPr>
+              <a:t>*</a:t>
+            </a:r>
+            <a:r>
+              <a:rPr lang="fr-FR" sz="1800" b="0">
+                <a:solidFill>
+                  <a:srgbClr val="000000"/>
+                </a:solidFill>
+                <a:highlight>
+                  <a:srgbClr val="FFFFFF"/>
+                </a:highlight>
+              </a:rPr>
+              <a:t> c</a:t>
+            </a:r>
+          </a:p>
+          <a:p>
+            <a:pPr marL="0" indent="0">
+              <a:lnSpc>
+                <a:spcPct val="120000"/>
+              </a:lnSpc>
+              <a:spcBef>
+                <a:spcPts val="0"/>
+              </a:spcBef>
+              <a:buNone/>
+            </a:pPr>
+            <a:r>
+              <a:rPr lang="nn-NO" sz="1800" b="0">
+                <a:solidFill>
+                  <a:srgbClr val="000000"/>
+                </a:solidFill>
+                <a:highlight>
+                  <a:srgbClr val="FFFFFF"/>
+                </a:highlight>
+              </a:rPr>
+              <a:t>prod_pv_2 </a:t>
+            </a:r>
+            <a:r>
+              <a:rPr lang="nn-NO" sz="1800" b="1">
+                <a:solidFill>
+                  <a:srgbClr val="000080"/>
+                </a:solidFill>
+                <a:highlight>
+                  <a:srgbClr val="FFFFFF"/>
+                </a:highlight>
+              </a:rPr>
+              <a:t>=</a:t>
+            </a:r>
+            <a:r>
+              <a:rPr lang="nn-NO" sz="1800" b="0">
+                <a:solidFill>
+                  <a:srgbClr val="000000"/>
+                </a:solidFill>
+                <a:highlight>
+                  <a:srgbClr val="FFFFFF"/>
+                </a:highlight>
+              </a:rPr>
+              <a:t> a</a:t>
+            </a:r>
+            <a:r>
+              <a:rPr lang="nn-NO" sz="1800" b="1">
+                <a:solidFill>
+                  <a:srgbClr val="000080"/>
+                </a:solidFill>
+                <a:highlight>
+                  <a:srgbClr val="FFFFFF"/>
+                </a:highlight>
+              </a:rPr>
+              <a:t>*</a:t>
+            </a:r>
+            <a:r>
+              <a:rPr lang="nn-NO" sz="1800" b="0">
+                <a:solidFill>
+                  <a:srgbClr val="000000"/>
+                </a:solidFill>
+                <a:highlight>
+                  <a:srgbClr val="FFFFFF"/>
+                </a:highlight>
+              </a:rPr>
+              <a:t>rad2 </a:t>
+            </a:r>
+            <a:r>
+              <a:rPr lang="nn-NO" sz="1800" b="1">
+                <a:solidFill>
+                  <a:srgbClr val="000080"/>
+                </a:solidFill>
+                <a:highlight>
+                  <a:srgbClr val="FFFFFF"/>
+                </a:highlight>
+              </a:rPr>
+              <a:t>+</a:t>
+            </a:r>
+            <a:r>
+              <a:rPr lang="nn-NO" sz="1800" b="0">
+                <a:solidFill>
+                  <a:srgbClr val="000000"/>
+                </a:solidFill>
+                <a:highlight>
+                  <a:srgbClr val="FFFFFF"/>
+                </a:highlight>
+              </a:rPr>
+              <a:t> b</a:t>
+            </a:r>
+            <a:r>
+              <a:rPr lang="nn-NO" sz="1800" b="1">
+                <a:solidFill>
+                  <a:srgbClr val="000080"/>
+                </a:solidFill>
+                <a:highlight>
+                  <a:srgbClr val="FFFFFF"/>
+                </a:highlight>
+              </a:rPr>
+              <a:t>*</a:t>
+            </a:r>
+            <a:r>
+              <a:rPr lang="nn-NO" sz="1800" b="0">
+                <a:solidFill>
+                  <a:srgbClr val="000000"/>
+                </a:solidFill>
+                <a:highlight>
+                  <a:srgbClr val="FFFFFF"/>
+                </a:highlight>
+              </a:rPr>
+              <a:t>rad2</a:t>
+            </a:r>
+            <a:r>
+              <a:rPr lang="nn-NO" sz="1800" b="1">
+                <a:solidFill>
+                  <a:srgbClr val="000080"/>
+                </a:solidFill>
+                <a:highlight>
+                  <a:srgbClr val="FFFFFF"/>
+                </a:highlight>
+              </a:rPr>
+              <a:t>^</a:t>
+            </a:r>
+            <a:r>
+              <a:rPr lang="nn-NO" sz="1800" b="0">
+                <a:solidFill>
+                  <a:srgbClr val="FF0000"/>
+                </a:solidFill>
+                <a:highlight>
+                  <a:srgbClr val="FFFFFF"/>
+                </a:highlight>
+              </a:rPr>
+              <a:t>2</a:t>
+            </a:r>
+            <a:r>
+              <a:rPr lang="nn-NO" sz="1800" b="0">
+                <a:solidFill>
+                  <a:srgbClr val="000000"/>
+                </a:solidFill>
+                <a:highlight>
+                  <a:srgbClr val="FFFFFF"/>
+                </a:highlight>
+              </a:rPr>
+              <a:t> </a:t>
+            </a:r>
+            <a:r>
+              <a:rPr lang="nn-NO" sz="1800" b="1">
+                <a:solidFill>
+                  <a:srgbClr val="000080"/>
+                </a:solidFill>
+                <a:highlight>
+                  <a:srgbClr val="FFFFFF"/>
+                </a:highlight>
+              </a:rPr>
+              <a:t>+</a:t>
+            </a:r>
+            <a:r>
+              <a:rPr lang="nn-NO" sz="1800" b="0">
+                <a:solidFill>
+                  <a:srgbClr val="000000"/>
+                </a:solidFill>
+                <a:highlight>
+                  <a:srgbClr val="FFFFFF"/>
+                </a:highlight>
+              </a:rPr>
+              <a:t> …</a:t>
+            </a:r>
+          </a:p>
+          <a:p>
+            <a:pPr marL="0" indent="0">
+              <a:lnSpc>
+                <a:spcPct val="120000"/>
+              </a:lnSpc>
+              <a:spcBef>
+                <a:spcPts val="0"/>
+              </a:spcBef>
+              <a:buNone/>
+            </a:pPr>
+            <a:r>
+              <a:rPr lang="fr-FR" sz="1800" b="0">
+                <a:solidFill>
+                  <a:srgbClr val="000000"/>
+                </a:solidFill>
+                <a:highlight>
+                  <a:srgbClr val="FFFFFF"/>
+                </a:highlight>
+              </a:rPr>
+              <a:t>prod_pv_2 </a:t>
+            </a:r>
+            <a:r>
+              <a:rPr lang="fr-FR" sz="1800" b="1">
+                <a:solidFill>
+                  <a:srgbClr val="000080"/>
+                </a:solidFill>
+                <a:highlight>
+                  <a:srgbClr val="FFFFFF"/>
+                </a:highlight>
+              </a:rPr>
+              <a:t>=</a:t>
+            </a:r>
+            <a:r>
+              <a:rPr lang="fr-FR" sz="1800" b="0">
+                <a:solidFill>
+                  <a:srgbClr val="000000"/>
+                </a:solidFill>
+                <a:highlight>
+                  <a:srgbClr val="FFFFFF"/>
+                </a:highlight>
+              </a:rPr>
+              <a:t> prod_pv_2 </a:t>
+            </a:r>
+            <a:r>
+              <a:rPr lang="fr-FR" sz="1800" b="1">
+                <a:solidFill>
+                  <a:srgbClr val="000080"/>
+                </a:solidFill>
+                <a:highlight>
+                  <a:srgbClr val="FFFFFF"/>
+                </a:highlight>
+              </a:rPr>
+              <a:t>*</a:t>
+            </a:r>
+            <a:r>
+              <a:rPr lang="fr-FR" sz="1800" b="0">
+                <a:solidFill>
+                  <a:srgbClr val="000000"/>
+                </a:solidFill>
+                <a:highlight>
+                  <a:srgbClr val="FFFFFF"/>
+                </a:highlight>
+              </a:rPr>
+              <a:t> atan</a:t>
+            </a:r>
+            <a:r>
+              <a:rPr lang="fr-FR" sz="1800" b="1">
+                <a:solidFill>
+                  <a:srgbClr val="000080"/>
+                </a:solidFill>
+                <a:highlight>
+                  <a:srgbClr val="FFFFFF"/>
+                </a:highlight>
+              </a:rPr>
+              <a:t>((</a:t>
+            </a:r>
+            <a:r>
+              <a:rPr lang="fr-FR" sz="1800" b="0">
+                <a:solidFill>
+                  <a:srgbClr val="000000"/>
+                </a:solidFill>
+                <a:highlight>
+                  <a:srgbClr val="FFFFFF"/>
+                </a:highlight>
+              </a:rPr>
+              <a:t>temp2</a:t>
+            </a:r>
+            <a:r>
+              <a:rPr lang="fr-FR" sz="1800" b="1">
+                <a:solidFill>
+                  <a:srgbClr val="000080"/>
+                </a:solidFill>
+                <a:highlight>
+                  <a:srgbClr val="FFFFFF"/>
+                </a:highlight>
+              </a:rPr>
+              <a:t>(</a:t>
+            </a:r>
+            <a:r>
+              <a:rPr lang="fr-FR" sz="1800" b="0">
+                <a:solidFill>
+                  <a:srgbClr val="000000"/>
+                </a:solidFill>
+                <a:highlight>
+                  <a:srgbClr val="FFFFFF"/>
+                </a:highlight>
+              </a:rPr>
+              <a:t>Tref</a:t>
+            </a:r>
+            <a:r>
+              <a:rPr lang="fr-FR" sz="1800" b="1">
+                <a:solidFill>
+                  <a:srgbClr val="000080"/>
+                </a:solidFill>
+                <a:highlight>
+                  <a:srgbClr val="FFFFFF"/>
+                </a:highlight>
+              </a:rPr>
+              <a:t>)/</a:t>
+            </a:r>
+            <a:r>
+              <a:rPr lang="fr-FR" sz="1800" b="0">
+                <a:solidFill>
+                  <a:srgbClr val="000000"/>
+                </a:solidFill>
+                <a:highlight>
+                  <a:srgbClr val="FFFFFF"/>
+                </a:highlight>
+              </a:rPr>
+              <a:t>Tref</a:t>
+            </a:r>
+            <a:r>
+              <a:rPr lang="fr-FR" sz="1800" b="1">
+                <a:solidFill>
+                  <a:srgbClr val="000080"/>
+                </a:solidFill>
+                <a:highlight>
+                  <a:srgbClr val="FFFFFF"/>
+                </a:highlight>
+              </a:rPr>
+              <a:t>)</a:t>
+            </a:r>
+            <a:r>
+              <a:rPr lang="fr-FR" sz="1800" b="0">
+                <a:solidFill>
+                  <a:srgbClr val="000000"/>
+                </a:solidFill>
+                <a:highlight>
+                  <a:srgbClr val="FFFFFF"/>
+                </a:highlight>
+              </a:rPr>
+              <a:t> </a:t>
+            </a:r>
+            <a:r>
+              <a:rPr lang="fr-FR" sz="1800" b="1">
+                <a:solidFill>
+                  <a:srgbClr val="000080"/>
+                </a:solidFill>
+                <a:highlight>
+                  <a:srgbClr val="FFFFFF"/>
+                </a:highlight>
+              </a:rPr>
+              <a:t>*</a:t>
+            </a:r>
+            <a:r>
+              <a:rPr lang="fr-FR" sz="1800" b="0">
+                <a:solidFill>
+                  <a:srgbClr val="000000"/>
+                </a:solidFill>
+                <a:highlight>
+                  <a:srgbClr val="FFFFFF"/>
+                </a:highlight>
+              </a:rPr>
+              <a:t> …</a:t>
+            </a:r>
+          </a:p>
+          <a:p>
+            <a:pPr marL="0" indent="0">
+              <a:lnSpc>
+                <a:spcPct val="120000"/>
+              </a:lnSpc>
+              <a:spcBef>
+                <a:spcPts val="0"/>
+              </a:spcBef>
+              <a:buNone/>
+            </a:pPr>
+            <a:endParaRPr lang="fr-FR" sz="1800" b="0">
+              <a:solidFill>
+                <a:srgbClr val="000000"/>
+              </a:solidFill>
+              <a:highlight>
+                <a:srgbClr val="FFFFFF"/>
+              </a:highlight>
+            </a:endParaRPr>
+          </a:p>
+          <a:p>
+            <a:pPr marL="0" indent="0">
+              <a:lnSpc>
+                <a:spcPct val="120000"/>
+              </a:lnSpc>
+              <a:spcBef>
+                <a:spcPts val="0"/>
+              </a:spcBef>
+              <a:buNone/>
+            </a:pPr>
+            <a:r>
+              <a:rPr lang="fr-FR" sz="1800" b="0">
+                <a:solidFill>
+                  <a:srgbClr val="008000"/>
+                </a:solidFill>
+                <a:highlight>
+                  <a:srgbClr val="FFFFFF"/>
+                </a:highlight>
+              </a:rPr>
+              <a:t># with a function</a:t>
+            </a:r>
+            <a:endParaRPr lang="fr-FR" sz="1800" b="0">
+              <a:solidFill>
+                <a:srgbClr val="000000"/>
+              </a:solidFill>
+              <a:highlight>
+                <a:srgbClr val="FFFFFF"/>
+              </a:highlight>
+            </a:endParaRPr>
+          </a:p>
+          <a:p>
+            <a:pPr marL="0" indent="0">
+              <a:lnSpc>
+                <a:spcPct val="120000"/>
+              </a:lnSpc>
+              <a:spcBef>
+                <a:spcPts val="0"/>
+              </a:spcBef>
+              <a:buNone/>
+            </a:pPr>
+            <a:r>
+              <a:rPr lang="fr-FR" sz="1800" b="1">
+                <a:solidFill>
+                  <a:srgbClr val="0000FF"/>
+                </a:solidFill>
+                <a:highlight>
+                  <a:srgbClr val="FFFFFF"/>
+                </a:highlight>
+              </a:rPr>
+              <a:t>def</a:t>
+            </a:r>
+            <a:r>
+              <a:rPr lang="fr-FR" sz="1800" b="0">
+                <a:solidFill>
+                  <a:srgbClr val="000000"/>
+                </a:solidFill>
+                <a:highlight>
+                  <a:srgbClr val="FFFFFF"/>
+                </a:highlight>
+              </a:rPr>
+              <a:t> </a:t>
+            </a:r>
+            <a:r>
+              <a:rPr lang="fr-FR" sz="1800" b="0">
+                <a:solidFill>
+                  <a:srgbClr val="FF00FF"/>
+                </a:solidFill>
+                <a:highlight>
+                  <a:srgbClr val="FFFFFF"/>
+                </a:highlight>
+              </a:rPr>
+              <a:t>calc_prod_pv</a:t>
+            </a:r>
+            <a:r>
+              <a:rPr lang="fr-FR" sz="1800" b="1">
+                <a:solidFill>
+                  <a:srgbClr val="000080"/>
+                </a:solidFill>
+                <a:highlight>
+                  <a:srgbClr val="FFFFFF"/>
+                </a:highlight>
+              </a:rPr>
+              <a:t>(</a:t>
+            </a:r>
+            <a:r>
+              <a:rPr lang="fr-FR" sz="1800" b="0">
+                <a:solidFill>
+                  <a:srgbClr val="000000"/>
+                </a:solidFill>
+                <a:highlight>
+                  <a:srgbClr val="FFFFFF"/>
+                </a:highlight>
+              </a:rPr>
+              <a:t>temp</a:t>
+            </a:r>
+            <a:r>
+              <a:rPr lang="fr-FR" sz="1800" b="1">
+                <a:solidFill>
+                  <a:srgbClr val="000080"/>
+                </a:solidFill>
+                <a:highlight>
+                  <a:srgbClr val="FFFFFF"/>
+                </a:highlight>
+              </a:rPr>
+              <a:t>,</a:t>
+            </a:r>
+            <a:r>
+              <a:rPr lang="fr-FR" sz="1800" b="0">
+                <a:solidFill>
+                  <a:srgbClr val="000000"/>
+                </a:solidFill>
+                <a:highlight>
+                  <a:srgbClr val="FFFFFF"/>
+                </a:highlight>
+              </a:rPr>
+              <a:t> rad</a:t>
+            </a:r>
+            <a:r>
+              <a:rPr lang="fr-FR" sz="1800" b="1">
+                <a:solidFill>
+                  <a:srgbClr val="000080"/>
+                </a:solidFill>
+                <a:highlight>
+                  <a:srgbClr val="FFFFFF"/>
+                </a:highlight>
+              </a:rPr>
+              <a:t>):</a:t>
+            </a:r>
+            <a:endParaRPr lang="fr-FR" sz="1800" b="0">
+              <a:solidFill>
+                <a:srgbClr val="000000"/>
+              </a:solidFill>
+              <a:highlight>
+                <a:srgbClr val="FFFFFF"/>
+              </a:highlight>
+            </a:endParaRPr>
+          </a:p>
+          <a:p>
+            <a:pPr marL="0" indent="0">
+              <a:lnSpc>
+                <a:spcPct val="120000"/>
+              </a:lnSpc>
+              <a:spcBef>
+                <a:spcPts val="0"/>
+              </a:spcBef>
+              <a:buNone/>
+            </a:pPr>
+            <a:r>
+              <a:rPr lang="fr-FR" sz="1800" b="0">
+                <a:solidFill>
+                  <a:srgbClr val="000000"/>
+                </a:solidFill>
+                <a:highlight>
+                  <a:srgbClr val="FFFFFF"/>
+                </a:highlight>
+              </a:rPr>
+              <a:t>    Tref </a:t>
+            </a:r>
+            <a:r>
+              <a:rPr lang="fr-FR" sz="1800" b="1">
+                <a:solidFill>
+                  <a:srgbClr val="000080"/>
+                </a:solidFill>
+                <a:highlight>
+                  <a:srgbClr val="FFFFFF"/>
+                </a:highlight>
+              </a:rPr>
+              <a:t>=</a:t>
+            </a:r>
+            <a:r>
+              <a:rPr lang="fr-FR" sz="1800" b="0">
+                <a:solidFill>
+                  <a:srgbClr val="000000"/>
+                </a:solidFill>
+                <a:highlight>
+                  <a:srgbClr val="FFFFFF"/>
+                </a:highlight>
+              </a:rPr>
+              <a:t> </a:t>
+            </a:r>
+            <a:r>
+              <a:rPr lang="fr-FR" sz="1800" b="0">
+                <a:solidFill>
+                  <a:srgbClr val="FF0000"/>
+                </a:solidFill>
+                <a:highlight>
+                  <a:srgbClr val="FFFFFF"/>
+                </a:highlight>
+              </a:rPr>
+              <a:t>273.15</a:t>
+            </a:r>
+            <a:endParaRPr lang="fr-FR" sz="1800" b="0">
+              <a:solidFill>
+                <a:srgbClr val="000000"/>
+              </a:solidFill>
+              <a:highlight>
+                <a:srgbClr val="FFFFFF"/>
+              </a:highlight>
+            </a:endParaRPr>
+          </a:p>
+          <a:p>
+            <a:pPr marL="0" indent="0">
+              <a:lnSpc>
+                <a:spcPct val="120000"/>
+              </a:lnSpc>
+              <a:spcBef>
+                <a:spcPts val="0"/>
+              </a:spcBef>
+              <a:buNone/>
+            </a:pPr>
+            <a:r>
+              <a:rPr lang="fr-FR" sz="1800" b="0">
+                <a:solidFill>
+                  <a:srgbClr val="000000"/>
+                </a:solidFill>
+                <a:highlight>
+                  <a:srgbClr val="FFFFFF"/>
+                </a:highlight>
+              </a:rPr>
+              <a:t>    prod </a:t>
+            </a:r>
+            <a:r>
+              <a:rPr lang="fr-FR" sz="1800" b="1">
+                <a:solidFill>
+                  <a:srgbClr val="000080"/>
+                </a:solidFill>
+                <a:highlight>
+                  <a:srgbClr val="FFFFFF"/>
+                </a:highlight>
+              </a:rPr>
+              <a:t>=</a:t>
+            </a:r>
+            <a:r>
+              <a:rPr lang="fr-FR" sz="1800" b="0">
+                <a:solidFill>
+                  <a:srgbClr val="000000"/>
+                </a:solidFill>
+                <a:highlight>
+                  <a:srgbClr val="FFFFFF"/>
+                </a:highlight>
+              </a:rPr>
+              <a:t> a</a:t>
+            </a:r>
+            <a:r>
+              <a:rPr lang="fr-FR" sz="1800" b="1">
+                <a:solidFill>
+                  <a:srgbClr val="000080"/>
+                </a:solidFill>
+                <a:highlight>
+                  <a:srgbClr val="FFFFFF"/>
+                </a:highlight>
+              </a:rPr>
+              <a:t>*</a:t>
+            </a:r>
+            <a:r>
+              <a:rPr lang="fr-FR" sz="1800" b="0">
+                <a:solidFill>
+                  <a:srgbClr val="000000"/>
+                </a:solidFill>
+                <a:highlight>
+                  <a:srgbClr val="FFFFFF"/>
+                </a:highlight>
+              </a:rPr>
+              <a:t>rad </a:t>
+            </a:r>
+            <a:r>
+              <a:rPr lang="fr-FR" sz="1800" b="1">
+                <a:solidFill>
+                  <a:srgbClr val="000080"/>
+                </a:solidFill>
+                <a:highlight>
+                  <a:srgbClr val="FFFFFF"/>
+                </a:highlight>
+              </a:rPr>
+              <a:t>+</a:t>
+            </a:r>
+            <a:r>
+              <a:rPr lang="fr-FR" sz="1800" b="0">
+                <a:solidFill>
+                  <a:srgbClr val="000000"/>
+                </a:solidFill>
+                <a:highlight>
+                  <a:srgbClr val="FFFFFF"/>
+                </a:highlight>
+              </a:rPr>
+              <a:t> b</a:t>
+            </a:r>
+            <a:r>
+              <a:rPr lang="fr-FR" sz="1800" b="1">
+                <a:solidFill>
+                  <a:srgbClr val="000080"/>
+                </a:solidFill>
+                <a:highlight>
+                  <a:srgbClr val="FFFFFF"/>
+                </a:highlight>
+              </a:rPr>
+              <a:t>*</a:t>
+            </a:r>
+            <a:r>
+              <a:rPr lang="fr-FR" sz="1800" b="0">
+                <a:solidFill>
+                  <a:srgbClr val="000000"/>
+                </a:solidFill>
+                <a:highlight>
+                  <a:srgbClr val="FFFFFF"/>
+                </a:highlight>
+              </a:rPr>
+              <a:t>rad</a:t>
+            </a:r>
+            <a:r>
+              <a:rPr lang="fr-FR" sz="1800" b="1">
+                <a:solidFill>
+                  <a:srgbClr val="000080"/>
+                </a:solidFill>
+                <a:highlight>
+                  <a:srgbClr val="FFFFFF"/>
+                </a:highlight>
+              </a:rPr>
+              <a:t>^</a:t>
+            </a:r>
+            <a:r>
+              <a:rPr lang="fr-FR" sz="1800" b="0">
+                <a:solidFill>
+                  <a:srgbClr val="FF0000"/>
+                </a:solidFill>
+                <a:highlight>
+                  <a:srgbClr val="FFFFFF"/>
+                </a:highlight>
+              </a:rPr>
+              <a:t>2</a:t>
+            </a:r>
+            <a:r>
+              <a:rPr lang="fr-FR" sz="1800" b="0">
+                <a:solidFill>
+                  <a:srgbClr val="000000"/>
+                </a:solidFill>
+                <a:highlight>
+                  <a:srgbClr val="FFFFFF"/>
+                </a:highlight>
+              </a:rPr>
+              <a:t> </a:t>
+            </a:r>
+            <a:r>
+              <a:rPr lang="fr-FR" sz="1800" b="1">
+                <a:solidFill>
+                  <a:srgbClr val="000080"/>
+                </a:solidFill>
+                <a:highlight>
+                  <a:srgbClr val="FFFFFF"/>
+                </a:highlight>
+              </a:rPr>
+              <a:t>+</a:t>
+            </a:r>
+            <a:r>
+              <a:rPr lang="fr-FR" sz="1800" b="0">
+                <a:solidFill>
+                  <a:srgbClr val="000000"/>
+                </a:solidFill>
+                <a:highlight>
+                  <a:srgbClr val="FFFFFF"/>
+                </a:highlight>
+              </a:rPr>
+              <a:t> …</a:t>
+            </a:r>
+          </a:p>
+          <a:p>
+            <a:pPr marL="0" indent="0">
+              <a:lnSpc>
+                <a:spcPct val="120000"/>
+              </a:lnSpc>
+              <a:spcBef>
+                <a:spcPts val="0"/>
+              </a:spcBef>
+              <a:buNone/>
+            </a:pPr>
+            <a:r>
+              <a:rPr lang="fr-FR" sz="1800" b="0">
+                <a:solidFill>
+                  <a:srgbClr val="000000"/>
+                </a:solidFill>
+                <a:highlight>
+                  <a:srgbClr val="FFFFFF"/>
+                </a:highlight>
+              </a:rPr>
+              <a:t>    prod </a:t>
+            </a:r>
+            <a:r>
+              <a:rPr lang="fr-FR" sz="1800" b="1">
+                <a:solidFill>
+                  <a:srgbClr val="000080"/>
+                </a:solidFill>
+                <a:highlight>
+                  <a:srgbClr val="FFFFFF"/>
+                </a:highlight>
+              </a:rPr>
+              <a:t>=</a:t>
+            </a:r>
+            <a:r>
+              <a:rPr lang="fr-FR" sz="1800" b="0">
+                <a:solidFill>
+                  <a:srgbClr val="000000"/>
+                </a:solidFill>
+                <a:highlight>
+                  <a:srgbClr val="FFFFFF"/>
+                </a:highlight>
+              </a:rPr>
+              <a:t> prod </a:t>
+            </a:r>
+            <a:r>
+              <a:rPr lang="fr-FR" sz="1800" b="1">
+                <a:solidFill>
+                  <a:srgbClr val="000080"/>
+                </a:solidFill>
+                <a:highlight>
+                  <a:srgbClr val="FFFFFF"/>
+                </a:highlight>
+              </a:rPr>
+              <a:t>*</a:t>
+            </a:r>
+            <a:r>
+              <a:rPr lang="fr-FR" sz="1800" b="0">
+                <a:solidFill>
+                  <a:srgbClr val="000000"/>
+                </a:solidFill>
+                <a:highlight>
+                  <a:srgbClr val="FFFFFF"/>
+                </a:highlight>
+              </a:rPr>
+              <a:t> atan</a:t>
+            </a:r>
+            <a:r>
+              <a:rPr lang="fr-FR" sz="1800" b="1">
+                <a:solidFill>
+                  <a:srgbClr val="000080"/>
+                </a:solidFill>
+                <a:highlight>
+                  <a:srgbClr val="FFFFFF"/>
+                </a:highlight>
+              </a:rPr>
+              <a:t>((</a:t>
+            </a:r>
+            <a:r>
+              <a:rPr lang="fr-FR" sz="1800" b="0">
+                <a:solidFill>
+                  <a:srgbClr val="000000"/>
+                </a:solidFill>
+                <a:highlight>
+                  <a:srgbClr val="FFFFFF"/>
+                </a:highlight>
+              </a:rPr>
+              <a:t>T</a:t>
+            </a:r>
+            <a:r>
+              <a:rPr lang="fr-FR" sz="1800" b="1">
+                <a:solidFill>
+                  <a:srgbClr val="000080"/>
+                </a:solidFill>
+                <a:highlight>
+                  <a:srgbClr val="FFFFFF"/>
+                </a:highlight>
+              </a:rPr>
+              <a:t>-</a:t>
+            </a:r>
+            <a:r>
+              <a:rPr lang="fr-FR" sz="1800" b="0">
+                <a:solidFill>
+                  <a:srgbClr val="000000"/>
+                </a:solidFill>
+                <a:highlight>
+                  <a:srgbClr val="FFFFFF"/>
+                </a:highlight>
+              </a:rPr>
+              <a:t>Tref</a:t>
+            </a:r>
+            <a:r>
+              <a:rPr lang="fr-FR" sz="1800" b="1">
+                <a:solidFill>
+                  <a:srgbClr val="000080"/>
+                </a:solidFill>
+                <a:highlight>
+                  <a:srgbClr val="FFFFFF"/>
+                </a:highlight>
+              </a:rPr>
+              <a:t>)/</a:t>
+            </a:r>
+            <a:r>
+              <a:rPr lang="fr-FR" sz="1800" b="0">
+                <a:solidFill>
+                  <a:srgbClr val="000000"/>
+                </a:solidFill>
+                <a:highlight>
+                  <a:srgbClr val="FFFFFF"/>
+                </a:highlight>
+              </a:rPr>
+              <a:t>Tref</a:t>
+            </a:r>
+            <a:r>
+              <a:rPr lang="fr-FR" sz="1800" b="1">
+                <a:solidFill>
+                  <a:srgbClr val="000080"/>
+                </a:solidFill>
+                <a:highlight>
+                  <a:srgbClr val="FFFFFF"/>
+                </a:highlight>
+              </a:rPr>
+              <a:t>)</a:t>
+            </a:r>
+            <a:r>
+              <a:rPr lang="fr-FR" sz="1800" b="0">
+                <a:solidFill>
+                  <a:srgbClr val="000000"/>
+                </a:solidFill>
+                <a:highlight>
+                  <a:srgbClr val="FFFFFF"/>
+                </a:highlight>
+              </a:rPr>
+              <a:t> </a:t>
+            </a:r>
+            <a:r>
+              <a:rPr lang="fr-FR" sz="1800" b="1">
+                <a:solidFill>
+                  <a:srgbClr val="000080"/>
+                </a:solidFill>
+                <a:highlight>
+                  <a:srgbClr val="FFFFFF"/>
+                </a:highlight>
+              </a:rPr>
+              <a:t>*</a:t>
+            </a:r>
+            <a:r>
+              <a:rPr lang="fr-FR" sz="1800" b="0">
+                <a:solidFill>
+                  <a:srgbClr val="000000"/>
+                </a:solidFill>
+                <a:highlight>
+                  <a:srgbClr val="FFFFFF"/>
+                </a:highlight>
+              </a:rPr>
+              <a:t> c</a:t>
+            </a:r>
+          </a:p>
+          <a:p>
+            <a:pPr marL="0" indent="0">
+              <a:lnSpc>
+                <a:spcPct val="120000"/>
+              </a:lnSpc>
+              <a:spcBef>
+                <a:spcPts val="0"/>
+              </a:spcBef>
+              <a:buNone/>
+            </a:pPr>
+            <a:r>
+              <a:rPr lang="fr-FR" sz="1800" b="1">
+                <a:solidFill>
+                  <a:srgbClr val="0000FF"/>
+                </a:solidFill>
+                <a:highlight>
+                  <a:srgbClr val="FFFFFF"/>
+                </a:highlight>
+              </a:rPr>
+              <a:t>return</a:t>
+            </a:r>
+            <a:r>
+              <a:rPr lang="fr-FR" sz="1800" b="0">
+                <a:solidFill>
+                  <a:srgbClr val="000000"/>
+                </a:solidFill>
+                <a:highlight>
+                  <a:srgbClr val="FFFFFF"/>
+                </a:highlight>
+              </a:rPr>
+              <a:t> prod</a:t>
+            </a:r>
+          </a:p>
+          <a:p>
+            <a:pPr marL="0" indent="0">
+              <a:lnSpc>
+                <a:spcPct val="120000"/>
+              </a:lnSpc>
+              <a:spcBef>
+                <a:spcPts val="0"/>
+              </a:spcBef>
+              <a:buNone/>
+            </a:pPr>
+            <a:endParaRPr lang="fr-FR" sz="1800" b="0">
+              <a:solidFill>
+                <a:srgbClr val="000000"/>
+              </a:solidFill>
+              <a:highlight>
+                <a:srgbClr val="FFFFFF"/>
+              </a:highlight>
+            </a:endParaRPr>
+          </a:p>
+          <a:p>
+            <a:pPr marL="0" indent="0">
+              <a:lnSpc>
+                <a:spcPct val="120000"/>
+              </a:lnSpc>
+              <a:spcBef>
+                <a:spcPts val="0"/>
+              </a:spcBef>
+              <a:buNone/>
+            </a:pPr>
+            <a:r>
+              <a:rPr lang="fr-FR" sz="1800" b="0">
+                <a:solidFill>
+                  <a:srgbClr val="000000"/>
+                </a:solidFill>
+                <a:highlight>
+                  <a:srgbClr val="FFFFFF"/>
+                </a:highlight>
+              </a:rPr>
+              <a:t>prod_pv_1 </a:t>
+            </a:r>
+            <a:r>
+              <a:rPr lang="fr-FR" sz="1800" b="1">
+                <a:solidFill>
+                  <a:srgbClr val="000080"/>
+                </a:solidFill>
+                <a:highlight>
+                  <a:srgbClr val="FFFFFF"/>
+                </a:highlight>
+              </a:rPr>
+              <a:t>=</a:t>
+            </a:r>
+            <a:r>
+              <a:rPr lang="fr-FR" sz="1800" b="0">
+                <a:solidFill>
+                  <a:srgbClr val="000000"/>
+                </a:solidFill>
+                <a:highlight>
+                  <a:srgbClr val="FFFFFF"/>
+                </a:highlight>
+              </a:rPr>
+              <a:t> calc_prod_pv</a:t>
+            </a:r>
+            <a:r>
+              <a:rPr lang="fr-FR" sz="1800" b="1">
+                <a:solidFill>
+                  <a:srgbClr val="000080"/>
+                </a:solidFill>
+                <a:highlight>
+                  <a:srgbClr val="FFFFFF"/>
+                </a:highlight>
+              </a:rPr>
+              <a:t>(</a:t>
+            </a:r>
+            <a:r>
+              <a:rPr lang="fr-FR" sz="1800" b="0">
+                <a:solidFill>
+                  <a:srgbClr val="000000"/>
+                </a:solidFill>
+                <a:highlight>
+                  <a:srgbClr val="FFFFFF"/>
+                </a:highlight>
+              </a:rPr>
+              <a:t>temp1</a:t>
+            </a:r>
+            <a:r>
+              <a:rPr lang="fr-FR" sz="1800" b="1">
+                <a:solidFill>
+                  <a:srgbClr val="000080"/>
+                </a:solidFill>
+                <a:highlight>
+                  <a:srgbClr val="FFFFFF"/>
+                </a:highlight>
+              </a:rPr>
+              <a:t>,</a:t>
+            </a:r>
+            <a:r>
+              <a:rPr lang="fr-FR" sz="1800" b="0">
+                <a:solidFill>
+                  <a:srgbClr val="000000"/>
+                </a:solidFill>
+                <a:highlight>
+                  <a:srgbClr val="FFFFFF"/>
+                </a:highlight>
+              </a:rPr>
+              <a:t> rad1</a:t>
+            </a:r>
+            <a:r>
+              <a:rPr lang="fr-FR" sz="1800" b="1">
+                <a:solidFill>
+                  <a:srgbClr val="000080"/>
+                </a:solidFill>
+                <a:highlight>
+                  <a:srgbClr val="FFFFFF"/>
+                </a:highlight>
+              </a:rPr>
+              <a:t>)</a:t>
+            </a:r>
+            <a:endParaRPr lang="fr-FR" sz="1800" b="0">
+              <a:solidFill>
+                <a:srgbClr val="000000"/>
+              </a:solidFill>
+              <a:highlight>
+                <a:srgbClr val="FFFFFF"/>
+              </a:highlight>
+            </a:endParaRPr>
+          </a:p>
+          <a:p>
+            <a:pPr marL="0" indent="0">
+              <a:lnSpc>
+                <a:spcPct val="120000"/>
+              </a:lnSpc>
+              <a:spcBef>
+                <a:spcPts val="0"/>
+              </a:spcBef>
+              <a:buNone/>
+            </a:pPr>
+            <a:r>
+              <a:rPr lang="fr-FR" sz="1800" b="0">
+                <a:solidFill>
+                  <a:srgbClr val="000000"/>
+                </a:solidFill>
+                <a:highlight>
+                  <a:srgbClr val="FFFFFF"/>
+                </a:highlight>
+              </a:rPr>
+              <a:t>prod_pv_2 </a:t>
+            </a:r>
+            <a:r>
+              <a:rPr lang="fr-FR" sz="1800" b="1">
+                <a:solidFill>
+                  <a:srgbClr val="000080"/>
+                </a:solidFill>
+                <a:highlight>
+                  <a:srgbClr val="FFFFFF"/>
+                </a:highlight>
+              </a:rPr>
+              <a:t>=</a:t>
+            </a:r>
+            <a:r>
+              <a:rPr lang="fr-FR" sz="1800" b="0">
+                <a:solidFill>
+                  <a:srgbClr val="000000"/>
+                </a:solidFill>
+                <a:highlight>
+                  <a:srgbClr val="FFFFFF"/>
+                </a:highlight>
+              </a:rPr>
+              <a:t> calc_prod_pv</a:t>
+            </a:r>
+            <a:r>
+              <a:rPr lang="fr-FR" sz="1800" b="1">
+                <a:solidFill>
+                  <a:srgbClr val="000080"/>
+                </a:solidFill>
+                <a:highlight>
+                  <a:srgbClr val="FFFFFF"/>
+                </a:highlight>
+              </a:rPr>
+              <a:t>(</a:t>
+            </a:r>
+            <a:r>
+              <a:rPr lang="fr-FR" sz="1800" b="0">
+                <a:solidFill>
+                  <a:srgbClr val="000000"/>
+                </a:solidFill>
+                <a:highlight>
+                  <a:srgbClr val="FFFFFF"/>
+                </a:highlight>
+              </a:rPr>
+              <a:t>temp2</a:t>
+            </a:r>
+            <a:r>
+              <a:rPr lang="fr-FR" sz="1800" b="1">
+                <a:solidFill>
+                  <a:srgbClr val="000080"/>
+                </a:solidFill>
+                <a:highlight>
+                  <a:srgbClr val="FFFFFF"/>
+                </a:highlight>
+              </a:rPr>
+              <a:t>,</a:t>
+            </a:r>
+            <a:r>
+              <a:rPr lang="fr-FR" sz="1800" b="0">
+                <a:solidFill>
+                  <a:srgbClr val="000000"/>
+                </a:solidFill>
+                <a:highlight>
+                  <a:srgbClr val="FFFFFF"/>
+                </a:highlight>
+              </a:rPr>
+              <a:t> rad2</a:t>
+            </a:r>
+            <a:r>
+              <a:rPr lang="fr-FR" sz="1800" b="1">
+                <a:solidFill>
+                  <a:srgbClr val="000080"/>
+                </a:solidFill>
+                <a:highlight>
+                  <a:srgbClr val="FFFFFF"/>
+                </a:highlight>
+              </a:rPr>
+              <a:t>)</a:t>
+            </a:r>
+            <a:endParaRPr lang="fr-FR" sz="2000"/>
           </a:p>
         </p:txBody>
       </p:sp>
     </p:spTree>
     <p:extLst>
       <p:ext uri="{BB962C8B-B14F-4D97-AF65-F5344CB8AC3E}">
-        <p14:creationId xmlns:p14="http://schemas.microsoft.com/office/powerpoint/2010/main" val="2722289105"/>
+        <p14:creationId xmlns:p14="http://schemas.microsoft.com/office/powerpoint/2010/main" val="1680298853"/>
       </p:ext>
     </p:extLst>
   </p:cSld>
@@ -6932,7 +8996,7 @@
           <p:cNvPr id="2" name="Titre 1">
             <a:extLst>
               <a:ext uri="{FF2B5EF4-FFF2-40B4-BE49-F238E27FC236}">
-                <a16:creationId xmlns:a16="http://schemas.microsoft.com/office/drawing/2014/main" id="{E98F1E3C-427C-4223-8396-9A72F39ADE89}"/>
+                <a16:creationId xmlns:a16="http://schemas.microsoft.com/office/drawing/2014/main" id="{E127E5E0-1DC1-4554-AF81-98E8DA585C59}"/>
               </a:ext>
             </a:extLst>
           </p:cNvPr>
@@ -6950,7 +9014,7 @@
           <a:p>
             <a:r>
               <a:rPr lang="fr-FR"/>
-              <a:t>Class 3/4</a:t>
+              <a:t>Before class 3/4</a:t>
             </a:r>
           </a:p>
         </p:txBody>
@@ -6960,7 +9024,7 @@
           <p:cNvPr id="3" name="Espace réservé du pied de page 2">
             <a:extLst>
               <a:ext uri="{FF2B5EF4-FFF2-40B4-BE49-F238E27FC236}">
-                <a16:creationId xmlns:a16="http://schemas.microsoft.com/office/drawing/2014/main" id="{FEEE38D0-F1FF-40EB-9A95-1A802E39A599}"/>
+                <a16:creationId xmlns:a16="http://schemas.microsoft.com/office/drawing/2014/main" id="{02AC8FE9-4200-49EA-A6FC-6D8E008E893E}"/>
               </a:ext>
             </a:extLst>
           </p:cNvPr>
@@ -6989,7 +9053,7 @@
           <p:cNvPr id="4" name="Espace réservé du numéro de diapositive 3">
             <a:extLst>
               <a:ext uri="{FF2B5EF4-FFF2-40B4-BE49-F238E27FC236}">
-                <a16:creationId xmlns:a16="http://schemas.microsoft.com/office/drawing/2014/main" id="{83A13E87-CF2C-4C23-8E87-E157EDBBD43A}"/>
+                <a16:creationId xmlns:a16="http://schemas.microsoft.com/office/drawing/2014/main" id="{D8F7555B-CF53-4E13-BF83-6C5C01392A68}"/>
               </a:ext>
             </a:extLst>
           </p:cNvPr>
@@ -7019,7 +9083,7 @@
           <p:cNvPr id="5" name="Espace réservé de la date 4">
             <a:extLst>
               <a:ext uri="{FF2B5EF4-FFF2-40B4-BE49-F238E27FC236}">
-                <a16:creationId xmlns:a16="http://schemas.microsoft.com/office/drawing/2014/main" id="{A7F9FE58-C74B-4DD8-A834-B503C38F5594}"/>
+                <a16:creationId xmlns:a16="http://schemas.microsoft.com/office/drawing/2014/main" id="{1B628939-3814-43DA-91CA-7A74FE30B1A4}"/>
               </a:ext>
             </a:extLst>
           </p:cNvPr>
@@ -7048,7 +9112,7 @@
           <p:cNvPr id="6" name="Espace réservé du contenu 5">
             <a:extLst>
               <a:ext uri="{FF2B5EF4-FFF2-40B4-BE49-F238E27FC236}">
-                <a16:creationId xmlns:a16="http://schemas.microsoft.com/office/drawing/2014/main" id="{06CA9F57-450F-4492-BF86-B98D6F69074C}"/>
+                <a16:creationId xmlns:a16="http://schemas.microsoft.com/office/drawing/2014/main" id="{BB2978E8-4FC1-4E1E-BFD3-9149C65C485B}"/>
               </a:ext>
             </a:extLst>
           </p:cNvPr>
@@ -7061,40 +9125,74 @@
         </p:nvSpPr>
         <p:spPr/>
         <p:txBody>
-          <a:bodyPr/>
-          <a:lstStyle/>
-          <a:p>
-            <a:r>
-              <a:rPr lang="fr-FR"/>
-              <a:t>Exercise on Lists p. 176</a:t>
-            </a:r>
-          </a:p>
-          <a:p>
-            <a:r>
-              <a:rPr lang="fr-FR"/>
-              <a:t>Exercise on Modules/librairies p. 51-55</a:t>
-            </a:r>
-          </a:p>
-          <a:p>
-            <a:r>
-              <a:rPr lang="fr-FR"/>
-              <a:t>Intro to Pandas p. 193</a:t>
-            </a:r>
-          </a:p>
-          <a:p>
-            <a:r>
-              <a:rPr lang="fr-FR"/>
-              <a:t>Intro to Numpy p. 218</a:t>
-            </a:r>
-          </a:p>
-          <a:p>
-            <a:r>
-              <a:rPr lang="fr-FR"/>
-              <a:t>Intro to Matplotlib p. 226</a:t>
-            </a:r>
-          </a:p>
-          <a:p>
+          <a:bodyPr>
+            <a:normAutofit/>
+          </a:bodyPr>
+          <a:lstStyle/>
+          <a:p>
+            <a:r>
+              <a:rPr lang="fr-FR"/>
+              <a:t>For the beginners</a:t>
+            </a:r>
+          </a:p>
+          <a:p>
+            <a:pPr lvl="1"/>
+            <a:r>
+              <a:rPr lang="fr-FR"/>
+              <a:t>Lists: read pp. 128-138, 138-144</a:t>
+            </a:r>
+          </a:p>
+          <a:p>
+            <a:pPr lvl="1"/>
+            <a:r>
+              <a:rPr lang="fr-FR"/>
+              <a:t>Dictionaries: read only p. 145</a:t>
+            </a:r>
+          </a:p>
+          <a:p>
+            <a:pPr lvl="1"/>
+            <a:r>
+              <a:rPr lang="fr-FR"/>
+              <a:t>Intro to modules: read pp. 51-58</a:t>
+            </a:r>
+          </a:p>
+          <a:p>
+            <a:pPr lvl="1"/>
+            <a:r>
+              <a:rPr lang="fr-FR"/>
+              <a:t>Intro to Numpy: read p. 218-220</a:t>
+            </a:r>
+          </a:p>
+          <a:p>
+            <a:pPr lvl="1"/>
+            <a:r>
+              <a:rPr lang="fr-FR"/>
+              <a:t>Intro to Matplotlib: skim read p. 226-240</a:t>
+            </a:r>
+          </a:p>
+          <a:p>
+            <a:pPr lvl="1"/>
+            <a:r>
+              <a:rPr lang="fr-FR"/>
+              <a:t>Intro to Pandas: skim read if you have the time p. 193-202</a:t>
+            </a:r>
+          </a:p>
+          <a:p>
+            <a:pPr lvl="1"/>
             <a:endParaRPr lang="fr-FR"/>
+          </a:p>
+          <a:p>
+            <a:r>
+              <a:rPr lang="fr-FR"/>
+              <a:t>For the more advanced students</a:t>
+            </a:r>
+          </a:p>
+          <a:p>
+            <a:pPr lvl="1"/>
+            <a:r>
+              <a:rPr lang="fr-FR"/>
+              <a:t>All together, clean up a version of your code to share it with the beginners</a:t>
+            </a:r>
           </a:p>
           <a:p>
             <a:pPr lvl="1"/>
@@ -7105,7 +9203,7 @@
     </p:spTree>
     <p:extLst>
       <p:ext uri="{BB962C8B-B14F-4D97-AF65-F5344CB8AC3E}">
-        <p14:creationId xmlns:p14="http://schemas.microsoft.com/office/powerpoint/2010/main" val="4191634379"/>
+        <p14:creationId xmlns:p14="http://schemas.microsoft.com/office/powerpoint/2010/main" val="2722289105"/>
       </p:ext>
     </p:extLst>
   </p:cSld>

</xml_diff>